<commit_message>
Added latch to the 2-bit Flash ADC
Updated figure in README and added 74LS75 to hold the output while value is being read. Enable pin active high and needs to be pulled low to hold value
</commit_message>
<xml_diff>
--- a/ADC_Design/FIgures/ADC_2-bit_Architecture.pptx
+++ b/ADC_Design/FIgures/ADC_2-bit_Architecture.pptx
@@ -259,7 +259,7 @@
           <a:p>
             <a:fld id="{624A1D4A-3BD5-4492-98F6-F753A11110B9}" type="datetimeFigureOut">
               <a:rPr lang="en-US" smtClean="0"/>
-              <a:t>5/19/2024</a:t>
+              <a:t>5/23/2024</a:t>
             </a:fld>
             <a:endParaRPr lang="en-US"/>
           </a:p>
@@ -457,7 +457,7 @@
           <a:p>
             <a:fld id="{624A1D4A-3BD5-4492-98F6-F753A11110B9}" type="datetimeFigureOut">
               <a:rPr lang="en-US" smtClean="0"/>
-              <a:t>5/19/2024</a:t>
+              <a:t>5/23/2024</a:t>
             </a:fld>
             <a:endParaRPr lang="en-US"/>
           </a:p>
@@ -665,7 +665,7 @@
           <a:p>
             <a:fld id="{624A1D4A-3BD5-4492-98F6-F753A11110B9}" type="datetimeFigureOut">
               <a:rPr lang="en-US" smtClean="0"/>
-              <a:t>5/19/2024</a:t>
+              <a:t>5/23/2024</a:t>
             </a:fld>
             <a:endParaRPr lang="en-US"/>
           </a:p>
@@ -863,7 +863,7 @@
           <a:p>
             <a:fld id="{624A1D4A-3BD5-4492-98F6-F753A11110B9}" type="datetimeFigureOut">
               <a:rPr lang="en-US" smtClean="0"/>
-              <a:t>5/19/2024</a:t>
+              <a:t>5/23/2024</a:t>
             </a:fld>
             <a:endParaRPr lang="en-US"/>
           </a:p>
@@ -1138,7 +1138,7 @@
           <a:p>
             <a:fld id="{624A1D4A-3BD5-4492-98F6-F753A11110B9}" type="datetimeFigureOut">
               <a:rPr lang="en-US" smtClean="0"/>
-              <a:t>5/19/2024</a:t>
+              <a:t>5/23/2024</a:t>
             </a:fld>
             <a:endParaRPr lang="en-US"/>
           </a:p>
@@ -1403,7 +1403,7 @@
           <a:p>
             <a:fld id="{624A1D4A-3BD5-4492-98F6-F753A11110B9}" type="datetimeFigureOut">
               <a:rPr lang="en-US" smtClean="0"/>
-              <a:t>5/19/2024</a:t>
+              <a:t>5/23/2024</a:t>
             </a:fld>
             <a:endParaRPr lang="en-US"/>
           </a:p>
@@ -1815,7 +1815,7 @@
           <a:p>
             <a:fld id="{624A1D4A-3BD5-4492-98F6-F753A11110B9}" type="datetimeFigureOut">
               <a:rPr lang="en-US" smtClean="0"/>
-              <a:t>5/19/2024</a:t>
+              <a:t>5/23/2024</a:t>
             </a:fld>
             <a:endParaRPr lang="en-US"/>
           </a:p>
@@ -1956,7 +1956,7 @@
           <a:p>
             <a:fld id="{624A1D4A-3BD5-4492-98F6-F753A11110B9}" type="datetimeFigureOut">
               <a:rPr lang="en-US" smtClean="0"/>
-              <a:t>5/19/2024</a:t>
+              <a:t>5/23/2024</a:t>
             </a:fld>
             <a:endParaRPr lang="en-US"/>
           </a:p>
@@ -2069,7 +2069,7 @@
           <a:p>
             <a:fld id="{624A1D4A-3BD5-4492-98F6-F753A11110B9}" type="datetimeFigureOut">
               <a:rPr lang="en-US" smtClean="0"/>
-              <a:t>5/19/2024</a:t>
+              <a:t>5/23/2024</a:t>
             </a:fld>
             <a:endParaRPr lang="en-US"/>
           </a:p>
@@ -2380,7 +2380,7 @@
           <a:p>
             <a:fld id="{624A1D4A-3BD5-4492-98F6-F753A11110B9}" type="datetimeFigureOut">
               <a:rPr lang="en-US" smtClean="0"/>
-              <a:t>5/19/2024</a:t>
+              <a:t>5/23/2024</a:t>
             </a:fld>
             <a:endParaRPr lang="en-US"/>
           </a:p>
@@ -2668,7 +2668,7 @@
           <a:p>
             <a:fld id="{624A1D4A-3BD5-4492-98F6-F753A11110B9}" type="datetimeFigureOut">
               <a:rPr lang="en-US" smtClean="0"/>
-              <a:t>5/19/2024</a:t>
+              <a:t>5/23/2024</a:t>
             </a:fld>
             <a:endParaRPr lang="en-US"/>
           </a:p>
@@ -2909,7 +2909,7 @@
           <a:p>
             <a:fld id="{624A1D4A-3BD5-4492-98F6-F753A11110B9}" type="datetimeFigureOut">
               <a:rPr lang="en-US" smtClean="0"/>
-              <a:t>5/19/2024</a:t>
+              <a:t>5/23/2024</a:t>
             </a:fld>
             <a:endParaRPr lang="en-US"/>
           </a:p>
@@ -3909,6 +3909,86 @@
               <a:rPr lang="en-US" sz="1200" dirty="0"/>
               <a:t>2</a:t>
             </a:r>
+          </a:p>
+        </p:txBody>
+      </p:sp>
+      <p:cxnSp>
+        <p:nvCxnSpPr>
+          <p:cNvPr id="2" name="Straight Arrow Connector 1">
+            <a:extLst>
+              <a:ext uri="{FF2B5EF4-FFF2-40B4-BE49-F238E27FC236}">
+                <a16:creationId xmlns:a16="http://schemas.microsoft.com/office/drawing/2014/main" id="{BBD96E8E-8A04-A896-5060-EADAB144BF15}"/>
+              </a:ext>
+            </a:extLst>
+          </p:cNvPr>
+          <p:cNvCxnSpPr>
+            <a:cxnSpLocks/>
+          </p:cNvCxnSpPr>
+          <p:nvPr/>
+        </p:nvCxnSpPr>
+        <p:spPr>
+          <a:xfrm>
+            <a:off x="2488899" y="3488116"/>
+            <a:ext cx="1070270" cy="0"/>
+          </a:xfrm>
+          <a:prstGeom prst="straightConnector1">
+            <a:avLst/>
+          </a:prstGeom>
+          <a:ln>
+            <a:solidFill>
+              <a:schemeClr val="tx1"/>
+            </a:solidFill>
+            <a:tailEnd type="triangle"/>
+          </a:ln>
+        </p:spPr>
+        <p:style>
+          <a:lnRef idx="2">
+            <a:schemeClr val="accent1"/>
+          </a:lnRef>
+          <a:fillRef idx="0">
+            <a:schemeClr val="accent1"/>
+          </a:fillRef>
+          <a:effectRef idx="1">
+            <a:schemeClr val="accent1"/>
+          </a:effectRef>
+          <a:fontRef idx="minor">
+            <a:schemeClr val="tx1"/>
+          </a:fontRef>
+        </p:style>
+      </p:cxnSp>
+      <p:sp>
+        <p:nvSpPr>
+          <p:cNvPr id="3" name="TextBox 2">
+            <a:extLst>
+              <a:ext uri="{FF2B5EF4-FFF2-40B4-BE49-F238E27FC236}">
+                <a16:creationId xmlns:a16="http://schemas.microsoft.com/office/drawing/2014/main" id="{0AA60838-635D-D128-CFB7-A90ED538805A}"/>
+              </a:ext>
+            </a:extLst>
+          </p:cNvPr>
+          <p:cNvSpPr txBox="1"/>
+          <p:nvPr/>
+        </p:nvSpPr>
+        <p:spPr>
+          <a:xfrm>
+            <a:off x="2521995" y="3233937"/>
+            <a:ext cx="354584" cy="276999"/>
+          </a:xfrm>
+          <a:prstGeom prst="rect">
+            <a:avLst/>
+          </a:prstGeom>
+          <a:noFill/>
+        </p:spPr>
+        <p:txBody>
+          <a:bodyPr wrap="none" rtlCol="0">
+            <a:spAutoFit/>
+          </a:bodyPr>
+          <a:lstStyle/>
+          <a:p>
+            <a:r>
+              <a:rPr lang="en-US" sz="1200" dirty="0"/>
+              <a:t>En</a:t>
+            </a:r>
+            <a:endParaRPr lang="en-US" sz="1200" baseline="-25000" dirty="0"/>
           </a:p>
         </p:txBody>
       </p:sp>

</xml_diff>

<commit_message>
Added Flowchart and other updated to readme
</commit_message>
<xml_diff>
--- a/ADC_Design/FIgures/ADC_2-bit_Architecture.pptx
+++ b/ADC_Design/FIgures/ADC_2-bit_Architecture.pptx
@@ -6,6 +6,7 @@
   </p:sldMasterIdLst>
   <p:sldIdLst>
     <p:sldId id="256" r:id="rId2"/>
+    <p:sldId id="257" r:id="rId3"/>
   </p:sldIdLst>
   <p:sldSz cx="12192000" cy="6858000"/>
   <p:notesSz cx="6858000" cy="9144000"/>
@@ -259,7 +260,7 @@
           <a:p>
             <a:fld id="{624A1D4A-3BD5-4492-98F6-F753A11110B9}" type="datetimeFigureOut">
               <a:rPr lang="en-US" smtClean="0"/>
-              <a:t>5/23/2024</a:t>
+              <a:t>6/9/2024</a:t>
             </a:fld>
             <a:endParaRPr lang="en-US"/>
           </a:p>
@@ -457,7 +458,7 @@
           <a:p>
             <a:fld id="{624A1D4A-3BD5-4492-98F6-F753A11110B9}" type="datetimeFigureOut">
               <a:rPr lang="en-US" smtClean="0"/>
-              <a:t>5/23/2024</a:t>
+              <a:t>6/9/2024</a:t>
             </a:fld>
             <a:endParaRPr lang="en-US"/>
           </a:p>
@@ -665,7 +666,7 @@
           <a:p>
             <a:fld id="{624A1D4A-3BD5-4492-98F6-F753A11110B9}" type="datetimeFigureOut">
               <a:rPr lang="en-US" smtClean="0"/>
-              <a:t>5/23/2024</a:t>
+              <a:t>6/9/2024</a:t>
             </a:fld>
             <a:endParaRPr lang="en-US"/>
           </a:p>
@@ -863,7 +864,7 @@
           <a:p>
             <a:fld id="{624A1D4A-3BD5-4492-98F6-F753A11110B9}" type="datetimeFigureOut">
               <a:rPr lang="en-US" smtClean="0"/>
-              <a:t>5/23/2024</a:t>
+              <a:t>6/9/2024</a:t>
             </a:fld>
             <a:endParaRPr lang="en-US"/>
           </a:p>
@@ -1138,7 +1139,7 @@
           <a:p>
             <a:fld id="{624A1D4A-3BD5-4492-98F6-F753A11110B9}" type="datetimeFigureOut">
               <a:rPr lang="en-US" smtClean="0"/>
-              <a:t>5/23/2024</a:t>
+              <a:t>6/9/2024</a:t>
             </a:fld>
             <a:endParaRPr lang="en-US"/>
           </a:p>
@@ -1403,7 +1404,7 @@
           <a:p>
             <a:fld id="{624A1D4A-3BD5-4492-98F6-F753A11110B9}" type="datetimeFigureOut">
               <a:rPr lang="en-US" smtClean="0"/>
-              <a:t>5/23/2024</a:t>
+              <a:t>6/9/2024</a:t>
             </a:fld>
             <a:endParaRPr lang="en-US"/>
           </a:p>
@@ -1815,7 +1816,7 @@
           <a:p>
             <a:fld id="{624A1D4A-3BD5-4492-98F6-F753A11110B9}" type="datetimeFigureOut">
               <a:rPr lang="en-US" smtClean="0"/>
-              <a:t>5/23/2024</a:t>
+              <a:t>6/9/2024</a:t>
             </a:fld>
             <a:endParaRPr lang="en-US"/>
           </a:p>
@@ -1956,7 +1957,7 @@
           <a:p>
             <a:fld id="{624A1D4A-3BD5-4492-98F6-F753A11110B9}" type="datetimeFigureOut">
               <a:rPr lang="en-US" smtClean="0"/>
-              <a:t>5/23/2024</a:t>
+              <a:t>6/9/2024</a:t>
             </a:fld>
             <a:endParaRPr lang="en-US"/>
           </a:p>
@@ -2069,7 +2070,7 @@
           <a:p>
             <a:fld id="{624A1D4A-3BD5-4492-98F6-F753A11110B9}" type="datetimeFigureOut">
               <a:rPr lang="en-US" smtClean="0"/>
-              <a:t>5/23/2024</a:t>
+              <a:t>6/9/2024</a:t>
             </a:fld>
             <a:endParaRPr lang="en-US"/>
           </a:p>
@@ -2380,7 +2381,7 @@
           <a:p>
             <a:fld id="{624A1D4A-3BD5-4492-98F6-F753A11110B9}" type="datetimeFigureOut">
               <a:rPr lang="en-US" smtClean="0"/>
-              <a:t>5/23/2024</a:t>
+              <a:t>6/9/2024</a:t>
             </a:fld>
             <a:endParaRPr lang="en-US"/>
           </a:p>
@@ -2668,7 +2669,7 @@
           <a:p>
             <a:fld id="{624A1D4A-3BD5-4492-98F6-F753A11110B9}" type="datetimeFigureOut">
               <a:rPr lang="en-US" smtClean="0"/>
-              <a:t>5/23/2024</a:t>
+              <a:t>6/9/2024</a:t>
             </a:fld>
             <a:endParaRPr lang="en-US"/>
           </a:p>
@@ -2909,7 +2910,7 @@
           <a:p>
             <a:fld id="{624A1D4A-3BD5-4492-98F6-F753A11110B9}" type="datetimeFigureOut">
               <a:rPr lang="en-US" smtClean="0"/>
-              <a:t>5/23/2024</a:t>
+              <a:t>6/9/2024</a:t>
             </a:fld>
             <a:endParaRPr lang="en-US"/>
           </a:p>
@@ -3996,6 +3997,363 @@
     <p:extLst>
       <p:ext uri="{BB962C8B-B14F-4D97-AF65-F5344CB8AC3E}">
         <p14:creationId xmlns:p14="http://schemas.microsoft.com/office/powerpoint/2010/main" val="1417383347"/>
+      </p:ext>
+    </p:extLst>
+  </p:cSld>
+  <p:clrMapOvr>
+    <a:masterClrMapping/>
+  </p:clrMapOvr>
+</p:sld>
+</file>
+
+<file path=ppt/slides/slide2.xml><?xml version="1.0" encoding="utf-8"?>
+<p:sld xmlns:a="http://schemas.openxmlformats.org/drawingml/2006/main" xmlns:r="http://schemas.openxmlformats.org/officeDocument/2006/relationships" xmlns:p="http://schemas.openxmlformats.org/presentationml/2006/main">
+  <p:cSld>
+    <p:spTree>
+      <p:nvGrpSpPr>
+        <p:cNvPr id="1" name=""/>
+        <p:cNvGrpSpPr/>
+        <p:nvPr/>
+      </p:nvGrpSpPr>
+      <p:grpSpPr>
+        <a:xfrm>
+          <a:off x="0" y="0"/>
+          <a:ext cx="0" cy="0"/>
+          <a:chOff x="0" y="0"/>
+          <a:chExt cx="0" cy="0"/>
+        </a:xfrm>
+      </p:grpSpPr>
+      <p:sp>
+        <p:nvSpPr>
+          <p:cNvPr id="4" name="Oval 3">
+            <a:extLst>
+              <a:ext uri="{FF2B5EF4-FFF2-40B4-BE49-F238E27FC236}">
+                <a16:creationId xmlns:a16="http://schemas.microsoft.com/office/drawing/2014/main" id="{FD9E674A-85E1-0ED8-9909-1BD890199215}"/>
+              </a:ext>
+            </a:extLst>
+          </p:cNvPr>
+          <p:cNvSpPr/>
+          <p:nvPr/>
+        </p:nvSpPr>
+        <p:spPr>
+          <a:xfrm>
+            <a:off x="2598486" y="2843590"/>
+            <a:ext cx="1170819" cy="1170819"/>
+          </a:xfrm>
+          <a:prstGeom prst="ellipse">
+            <a:avLst/>
+          </a:prstGeom>
+          <a:noFill/>
+          <a:ln w="28575">
+            <a:solidFill>
+              <a:schemeClr val="tx1"/>
+            </a:solidFill>
+          </a:ln>
+        </p:spPr>
+        <p:style>
+          <a:lnRef idx="2">
+            <a:schemeClr val="accent1">
+              <a:shade val="15000"/>
+            </a:schemeClr>
+          </a:lnRef>
+          <a:fillRef idx="1">
+            <a:schemeClr val="accent1"/>
+          </a:fillRef>
+          <a:effectRef idx="0">
+            <a:schemeClr val="accent1"/>
+          </a:effectRef>
+          <a:fontRef idx="minor">
+            <a:schemeClr val="lt1"/>
+          </a:fontRef>
+        </p:style>
+        <p:txBody>
+          <a:bodyPr rtlCol="0" anchor="ctr"/>
+          <a:lstStyle/>
+          <a:p>
+            <a:pPr algn="ctr"/>
+            <a:r>
+              <a:rPr lang="en-US" sz="1100" dirty="0">
+                <a:solidFill>
+                  <a:sysClr val="windowText" lastClr="000000"/>
+                </a:solidFill>
+              </a:rPr>
+              <a:t>En=LOW</a:t>
+            </a:r>
+          </a:p>
+        </p:txBody>
+      </p:sp>
+      <p:sp>
+        <p:nvSpPr>
+          <p:cNvPr id="5" name="Oval 4">
+            <a:extLst>
+              <a:ext uri="{FF2B5EF4-FFF2-40B4-BE49-F238E27FC236}">
+                <a16:creationId xmlns:a16="http://schemas.microsoft.com/office/drawing/2014/main" id="{D35B8F60-1E0F-0677-4396-78FD370E3757}"/>
+              </a:ext>
+            </a:extLst>
+          </p:cNvPr>
+          <p:cNvSpPr/>
+          <p:nvPr/>
+        </p:nvSpPr>
+        <p:spPr>
+          <a:xfrm>
+            <a:off x="4325043" y="2843590"/>
+            <a:ext cx="1170819" cy="1170819"/>
+          </a:xfrm>
+          <a:prstGeom prst="ellipse">
+            <a:avLst/>
+          </a:prstGeom>
+          <a:noFill/>
+          <a:ln w="28575">
+            <a:solidFill>
+              <a:schemeClr val="tx1"/>
+            </a:solidFill>
+          </a:ln>
+        </p:spPr>
+        <p:style>
+          <a:lnRef idx="2">
+            <a:schemeClr val="accent1">
+              <a:shade val="15000"/>
+            </a:schemeClr>
+          </a:lnRef>
+          <a:fillRef idx="1">
+            <a:schemeClr val="accent1"/>
+          </a:fillRef>
+          <a:effectRef idx="0">
+            <a:schemeClr val="accent1"/>
+          </a:effectRef>
+          <a:fontRef idx="minor">
+            <a:schemeClr val="lt1"/>
+          </a:fontRef>
+        </p:style>
+        <p:txBody>
+          <a:bodyPr rtlCol="0" anchor="ctr"/>
+          <a:lstStyle/>
+          <a:p>
+            <a:pPr algn="ctr"/>
+            <a:r>
+              <a:rPr lang="en-US" sz="1100" dirty="0">
+                <a:solidFill>
+                  <a:schemeClr val="tx1"/>
+                </a:solidFill>
+              </a:rPr>
+              <a:t>Read Data</a:t>
+            </a:r>
+          </a:p>
+        </p:txBody>
+      </p:sp>
+      <p:sp>
+        <p:nvSpPr>
+          <p:cNvPr id="6" name="Oval 5">
+            <a:extLst>
+              <a:ext uri="{FF2B5EF4-FFF2-40B4-BE49-F238E27FC236}">
+                <a16:creationId xmlns:a16="http://schemas.microsoft.com/office/drawing/2014/main" id="{B56BBF8A-E7F4-6E6D-4698-B9A152F04064}"/>
+              </a:ext>
+            </a:extLst>
+          </p:cNvPr>
+          <p:cNvSpPr/>
+          <p:nvPr/>
+        </p:nvSpPr>
+        <p:spPr>
+          <a:xfrm>
+            <a:off x="6051600" y="2843590"/>
+            <a:ext cx="1170819" cy="1170819"/>
+          </a:xfrm>
+          <a:prstGeom prst="ellipse">
+            <a:avLst/>
+          </a:prstGeom>
+          <a:noFill/>
+          <a:ln w="28575">
+            <a:solidFill>
+              <a:schemeClr val="tx1"/>
+            </a:solidFill>
+          </a:ln>
+        </p:spPr>
+        <p:style>
+          <a:lnRef idx="2">
+            <a:schemeClr val="accent1">
+              <a:shade val="15000"/>
+            </a:schemeClr>
+          </a:lnRef>
+          <a:fillRef idx="1">
+            <a:schemeClr val="accent1"/>
+          </a:fillRef>
+          <a:effectRef idx="0">
+            <a:schemeClr val="accent1"/>
+          </a:effectRef>
+          <a:fontRef idx="minor">
+            <a:schemeClr val="lt1"/>
+          </a:fontRef>
+        </p:style>
+        <p:txBody>
+          <a:bodyPr rtlCol="0" anchor="ctr"/>
+          <a:lstStyle/>
+          <a:p>
+            <a:pPr algn="ctr"/>
+            <a:r>
+              <a:rPr lang="en-US" sz="1100" dirty="0">
+                <a:solidFill>
+                  <a:schemeClr val="tx1"/>
+                </a:solidFill>
+              </a:rPr>
+              <a:t>En=HIGH</a:t>
+            </a:r>
+          </a:p>
+          <a:p>
+            <a:pPr algn="ctr"/>
+            <a:r>
+              <a:rPr lang="en-US" sz="1100" dirty="0">
+                <a:solidFill>
+                  <a:schemeClr val="tx1"/>
+                </a:solidFill>
+              </a:rPr>
+              <a:t>Delay</a:t>
+            </a:r>
+          </a:p>
+        </p:txBody>
+      </p:sp>
+      <p:cxnSp>
+        <p:nvCxnSpPr>
+          <p:cNvPr id="8" name="Straight Arrow Connector 7">
+            <a:extLst>
+              <a:ext uri="{FF2B5EF4-FFF2-40B4-BE49-F238E27FC236}">
+                <a16:creationId xmlns:a16="http://schemas.microsoft.com/office/drawing/2014/main" id="{7B89BB3B-3FA2-956C-8965-579866239307}"/>
+              </a:ext>
+            </a:extLst>
+          </p:cNvPr>
+          <p:cNvCxnSpPr>
+            <a:cxnSpLocks/>
+            <a:stCxn id="4" idx="6"/>
+            <a:endCxn id="5" idx="2"/>
+          </p:cNvCxnSpPr>
+          <p:nvPr/>
+        </p:nvCxnSpPr>
+        <p:spPr>
+          <a:xfrm>
+            <a:off x="3769305" y="3429000"/>
+            <a:ext cx="555738" cy="0"/>
+          </a:xfrm>
+          <a:prstGeom prst="straightConnector1">
+            <a:avLst/>
+          </a:prstGeom>
+          <a:ln>
+            <a:solidFill>
+              <a:schemeClr val="tx1"/>
+            </a:solidFill>
+            <a:tailEnd type="triangle"/>
+          </a:ln>
+        </p:spPr>
+        <p:style>
+          <a:lnRef idx="2">
+            <a:schemeClr val="accent1"/>
+          </a:lnRef>
+          <a:fillRef idx="0">
+            <a:schemeClr val="accent1"/>
+          </a:fillRef>
+          <a:effectRef idx="1">
+            <a:schemeClr val="accent1"/>
+          </a:effectRef>
+          <a:fontRef idx="minor">
+            <a:schemeClr val="tx1"/>
+          </a:fontRef>
+        </p:style>
+      </p:cxnSp>
+      <p:cxnSp>
+        <p:nvCxnSpPr>
+          <p:cNvPr id="9" name="Straight Arrow Connector 8">
+            <a:extLst>
+              <a:ext uri="{FF2B5EF4-FFF2-40B4-BE49-F238E27FC236}">
+                <a16:creationId xmlns:a16="http://schemas.microsoft.com/office/drawing/2014/main" id="{F2BF4EEA-C34C-305F-79EC-8CABCF366B24}"/>
+              </a:ext>
+            </a:extLst>
+          </p:cNvPr>
+          <p:cNvCxnSpPr>
+            <a:cxnSpLocks/>
+          </p:cNvCxnSpPr>
+          <p:nvPr/>
+        </p:nvCxnSpPr>
+        <p:spPr>
+          <a:xfrm>
+            <a:off x="5495862" y="3428999"/>
+            <a:ext cx="555738" cy="0"/>
+          </a:xfrm>
+          <a:prstGeom prst="straightConnector1">
+            <a:avLst/>
+          </a:prstGeom>
+          <a:ln>
+            <a:solidFill>
+              <a:schemeClr val="tx1"/>
+            </a:solidFill>
+            <a:tailEnd type="triangle"/>
+          </a:ln>
+        </p:spPr>
+        <p:style>
+          <a:lnRef idx="2">
+            <a:schemeClr val="accent1"/>
+          </a:lnRef>
+          <a:fillRef idx="0">
+            <a:schemeClr val="accent1"/>
+          </a:fillRef>
+          <a:effectRef idx="1">
+            <a:schemeClr val="accent1"/>
+          </a:effectRef>
+          <a:fontRef idx="minor">
+            <a:schemeClr val="tx1"/>
+          </a:fontRef>
+        </p:style>
+      </p:cxnSp>
+      <p:cxnSp>
+        <p:nvCxnSpPr>
+          <p:cNvPr id="11" name="Connector: Curved 10">
+            <a:extLst>
+              <a:ext uri="{FF2B5EF4-FFF2-40B4-BE49-F238E27FC236}">
+                <a16:creationId xmlns:a16="http://schemas.microsoft.com/office/drawing/2014/main" id="{F852AED6-5510-3BD3-2887-1CF180968412}"/>
+              </a:ext>
+            </a:extLst>
+          </p:cNvPr>
+          <p:cNvCxnSpPr>
+            <a:stCxn id="6" idx="6"/>
+            <a:endCxn id="4" idx="2"/>
+          </p:cNvCxnSpPr>
+          <p:nvPr/>
+        </p:nvCxnSpPr>
+        <p:spPr>
+          <a:xfrm flipH="1">
+            <a:off x="2598486" y="3429000"/>
+            <a:ext cx="4623933" cy="12700"/>
+          </a:xfrm>
+          <a:prstGeom prst="curvedConnector5">
+            <a:avLst>
+              <a:gd name="adj1" fmla="val -4944"/>
+              <a:gd name="adj2" fmla="val -8331701"/>
+              <a:gd name="adj3" fmla="val 104944"/>
+            </a:avLst>
+          </a:prstGeom>
+          <a:ln>
+            <a:solidFill>
+              <a:schemeClr val="tx1"/>
+            </a:solidFill>
+            <a:tailEnd type="triangle"/>
+          </a:ln>
+        </p:spPr>
+        <p:style>
+          <a:lnRef idx="2">
+            <a:schemeClr val="accent1"/>
+          </a:lnRef>
+          <a:fillRef idx="0">
+            <a:schemeClr val="accent1"/>
+          </a:fillRef>
+          <a:effectRef idx="1">
+            <a:schemeClr val="accent1"/>
+          </a:effectRef>
+          <a:fontRef idx="minor">
+            <a:schemeClr val="tx1"/>
+          </a:fontRef>
+        </p:style>
+      </p:cxnSp>
+    </p:spTree>
+    <p:extLst>
+      <p:ext uri="{BB962C8B-B14F-4D97-AF65-F5344CB8AC3E}">
+        <p14:creationId xmlns:p14="http://schemas.microsoft.com/office/powerpoint/2010/main" val="797213795"/>
       </p:ext>
     </p:extLst>
   </p:cSld>

</xml_diff>

<commit_message>
Added documentation for the development of the 4-bit Flash ADC including figures
</commit_message>
<xml_diff>
--- a/ADC_Design/FIgures/ADC_2-bit_Architecture.pptx
+++ b/ADC_Design/FIgures/ADC_2-bit_Architecture.pptx
@@ -6,7 +6,8 @@
   </p:sldMasterIdLst>
   <p:sldIdLst>
     <p:sldId id="256" r:id="rId2"/>
-    <p:sldId id="257" r:id="rId3"/>
+    <p:sldId id="258" r:id="rId3"/>
+    <p:sldId id="257" r:id="rId4"/>
   </p:sldIdLst>
   <p:sldSz cx="12192000" cy="6858000"/>
   <p:notesSz cx="6858000" cy="9144000"/>
@@ -260,7 +261,7 @@
           <a:p>
             <a:fld id="{624A1D4A-3BD5-4492-98F6-F753A11110B9}" type="datetimeFigureOut">
               <a:rPr lang="en-US" smtClean="0"/>
-              <a:t>6/9/2024</a:t>
+              <a:t>6/10/2024</a:t>
             </a:fld>
             <a:endParaRPr lang="en-US"/>
           </a:p>
@@ -458,7 +459,7 @@
           <a:p>
             <a:fld id="{624A1D4A-3BD5-4492-98F6-F753A11110B9}" type="datetimeFigureOut">
               <a:rPr lang="en-US" smtClean="0"/>
-              <a:t>6/9/2024</a:t>
+              <a:t>6/10/2024</a:t>
             </a:fld>
             <a:endParaRPr lang="en-US"/>
           </a:p>
@@ -666,7 +667,7 @@
           <a:p>
             <a:fld id="{624A1D4A-3BD5-4492-98F6-F753A11110B9}" type="datetimeFigureOut">
               <a:rPr lang="en-US" smtClean="0"/>
-              <a:t>6/9/2024</a:t>
+              <a:t>6/10/2024</a:t>
             </a:fld>
             <a:endParaRPr lang="en-US"/>
           </a:p>
@@ -864,7 +865,7 @@
           <a:p>
             <a:fld id="{624A1D4A-3BD5-4492-98F6-F753A11110B9}" type="datetimeFigureOut">
               <a:rPr lang="en-US" smtClean="0"/>
-              <a:t>6/9/2024</a:t>
+              <a:t>6/10/2024</a:t>
             </a:fld>
             <a:endParaRPr lang="en-US"/>
           </a:p>
@@ -1139,7 +1140,7 @@
           <a:p>
             <a:fld id="{624A1D4A-3BD5-4492-98F6-F753A11110B9}" type="datetimeFigureOut">
               <a:rPr lang="en-US" smtClean="0"/>
-              <a:t>6/9/2024</a:t>
+              <a:t>6/10/2024</a:t>
             </a:fld>
             <a:endParaRPr lang="en-US"/>
           </a:p>
@@ -1404,7 +1405,7 @@
           <a:p>
             <a:fld id="{624A1D4A-3BD5-4492-98F6-F753A11110B9}" type="datetimeFigureOut">
               <a:rPr lang="en-US" smtClean="0"/>
-              <a:t>6/9/2024</a:t>
+              <a:t>6/10/2024</a:t>
             </a:fld>
             <a:endParaRPr lang="en-US"/>
           </a:p>
@@ -1816,7 +1817,7 @@
           <a:p>
             <a:fld id="{624A1D4A-3BD5-4492-98F6-F753A11110B9}" type="datetimeFigureOut">
               <a:rPr lang="en-US" smtClean="0"/>
-              <a:t>6/9/2024</a:t>
+              <a:t>6/10/2024</a:t>
             </a:fld>
             <a:endParaRPr lang="en-US"/>
           </a:p>
@@ -1957,7 +1958,7 @@
           <a:p>
             <a:fld id="{624A1D4A-3BD5-4492-98F6-F753A11110B9}" type="datetimeFigureOut">
               <a:rPr lang="en-US" smtClean="0"/>
-              <a:t>6/9/2024</a:t>
+              <a:t>6/10/2024</a:t>
             </a:fld>
             <a:endParaRPr lang="en-US"/>
           </a:p>
@@ -2070,7 +2071,7 @@
           <a:p>
             <a:fld id="{624A1D4A-3BD5-4492-98F6-F753A11110B9}" type="datetimeFigureOut">
               <a:rPr lang="en-US" smtClean="0"/>
-              <a:t>6/9/2024</a:t>
+              <a:t>6/10/2024</a:t>
             </a:fld>
             <a:endParaRPr lang="en-US"/>
           </a:p>
@@ -2381,7 +2382,7 @@
           <a:p>
             <a:fld id="{624A1D4A-3BD5-4492-98F6-F753A11110B9}" type="datetimeFigureOut">
               <a:rPr lang="en-US" smtClean="0"/>
-              <a:t>6/9/2024</a:t>
+              <a:t>6/10/2024</a:t>
             </a:fld>
             <a:endParaRPr lang="en-US"/>
           </a:p>
@@ -2669,7 +2670,7 @@
           <a:p>
             <a:fld id="{624A1D4A-3BD5-4492-98F6-F753A11110B9}" type="datetimeFigureOut">
               <a:rPr lang="en-US" smtClean="0"/>
-              <a:t>6/9/2024</a:t>
+              <a:t>6/10/2024</a:t>
             </a:fld>
             <a:endParaRPr lang="en-US"/>
           </a:p>
@@ -2910,7 +2911,7 @@
           <a:p>
             <a:fld id="{624A1D4A-3BD5-4492-98F6-F753A11110B9}" type="datetimeFigureOut">
               <a:rPr lang="en-US" smtClean="0"/>
-              <a:t>6/9/2024</a:t>
+              <a:t>6/10/2024</a:t>
             </a:fld>
             <a:endParaRPr lang="en-US"/>
           </a:p>
@@ -4007,6 +4008,702 @@
 </file>
 
 <file path=ppt/slides/slide2.xml><?xml version="1.0" encoding="utf-8"?>
+<p:sld xmlns:a="http://schemas.openxmlformats.org/drawingml/2006/main" xmlns:r="http://schemas.openxmlformats.org/officeDocument/2006/relationships" xmlns:p="http://schemas.openxmlformats.org/presentationml/2006/main">
+  <p:cSld>
+    <p:spTree>
+      <p:nvGrpSpPr>
+        <p:cNvPr id="1" name=""/>
+        <p:cNvGrpSpPr/>
+        <p:nvPr/>
+      </p:nvGrpSpPr>
+      <p:grpSpPr>
+        <a:xfrm>
+          <a:off x="0" y="0"/>
+          <a:ext cx="0" cy="0"/>
+          <a:chOff x="0" y="0"/>
+          <a:chExt cx="0" cy="0"/>
+        </a:xfrm>
+      </p:grpSpPr>
+      <p:sp>
+        <p:nvSpPr>
+          <p:cNvPr id="4" name="Rectangle: Rounded Corners 3">
+            <a:extLst>
+              <a:ext uri="{FF2B5EF4-FFF2-40B4-BE49-F238E27FC236}">
+                <a16:creationId xmlns:a16="http://schemas.microsoft.com/office/drawing/2014/main" id="{14691189-81C0-5643-A46A-C9AE0A999DE9}"/>
+              </a:ext>
+            </a:extLst>
+          </p:cNvPr>
+          <p:cNvSpPr/>
+          <p:nvPr/>
+        </p:nvSpPr>
+        <p:spPr>
+          <a:xfrm>
+            <a:off x="2970784" y="1560890"/>
+            <a:ext cx="4185920" cy="3011110"/>
+          </a:xfrm>
+          <a:prstGeom prst="roundRect">
+            <a:avLst/>
+          </a:prstGeom>
+          <a:noFill/>
+          <a:ln w="19050"/>
+        </p:spPr>
+        <p:style>
+          <a:lnRef idx="2">
+            <a:schemeClr val="accent1">
+              <a:shade val="15000"/>
+            </a:schemeClr>
+          </a:lnRef>
+          <a:fillRef idx="1">
+            <a:schemeClr val="accent1"/>
+          </a:fillRef>
+          <a:effectRef idx="0">
+            <a:schemeClr val="accent1"/>
+          </a:effectRef>
+          <a:fontRef idx="minor">
+            <a:schemeClr val="lt1"/>
+          </a:fontRef>
+        </p:style>
+        <p:txBody>
+          <a:bodyPr rtlCol="0" anchor="ctr"/>
+          <a:lstStyle/>
+          <a:p>
+            <a:pPr algn="ctr"/>
+            <a:endParaRPr lang="en-US" sz="1200" dirty="0">
+              <a:solidFill>
+                <a:schemeClr val="tx1"/>
+              </a:solidFill>
+            </a:endParaRPr>
+          </a:p>
+        </p:txBody>
+      </p:sp>
+      <p:sp>
+        <p:nvSpPr>
+          <p:cNvPr id="5" name="Rectangle: Rounded Corners 4">
+            <a:extLst>
+              <a:ext uri="{FF2B5EF4-FFF2-40B4-BE49-F238E27FC236}">
+                <a16:creationId xmlns:a16="http://schemas.microsoft.com/office/drawing/2014/main" id="{A368E1D5-07FA-4E57-E6ED-0FAE82608C00}"/>
+              </a:ext>
+            </a:extLst>
+          </p:cNvPr>
+          <p:cNvSpPr/>
+          <p:nvPr/>
+        </p:nvSpPr>
+        <p:spPr>
+          <a:xfrm>
+            <a:off x="7806084" y="2256063"/>
+            <a:ext cx="943598" cy="1620762"/>
+          </a:xfrm>
+          <a:prstGeom prst="roundRect">
+            <a:avLst/>
+          </a:prstGeom>
+          <a:noFill/>
+          <a:ln w="19050"/>
+        </p:spPr>
+        <p:style>
+          <a:lnRef idx="2">
+            <a:schemeClr val="accent1">
+              <a:shade val="15000"/>
+            </a:schemeClr>
+          </a:lnRef>
+          <a:fillRef idx="1">
+            <a:schemeClr val="accent1"/>
+          </a:fillRef>
+          <a:effectRef idx="0">
+            <a:schemeClr val="accent1"/>
+          </a:effectRef>
+          <a:fontRef idx="minor">
+            <a:schemeClr val="lt1"/>
+          </a:fontRef>
+        </p:style>
+        <p:txBody>
+          <a:bodyPr rtlCol="0" anchor="ctr"/>
+          <a:lstStyle/>
+          <a:p>
+            <a:pPr algn="ctr"/>
+            <a:r>
+              <a:rPr lang="en-US" sz="1200" dirty="0">
+                <a:solidFill>
+                  <a:schemeClr val="tx1"/>
+                </a:solidFill>
+              </a:rPr>
+              <a:t>MCU</a:t>
+            </a:r>
+          </a:p>
+        </p:txBody>
+      </p:sp>
+      <p:cxnSp>
+        <p:nvCxnSpPr>
+          <p:cNvPr id="7" name="Straight Arrow Connector 6">
+            <a:extLst>
+              <a:ext uri="{FF2B5EF4-FFF2-40B4-BE49-F238E27FC236}">
+                <a16:creationId xmlns:a16="http://schemas.microsoft.com/office/drawing/2014/main" id="{7F294A37-500F-6D15-C7AF-9E61899C544B}"/>
+              </a:ext>
+            </a:extLst>
+          </p:cNvPr>
+          <p:cNvCxnSpPr>
+            <a:cxnSpLocks/>
+            <a:endCxn id="23" idx="1"/>
+          </p:cNvCxnSpPr>
+          <p:nvPr/>
+        </p:nvCxnSpPr>
+        <p:spPr>
+          <a:xfrm>
+            <a:off x="2488899" y="3066445"/>
+            <a:ext cx="1070270" cy="0"/>
+          </a:xfrm>
+          <a:prstGeom prst="straightConnector1">
+            <a:avLst/>
+          </a:prstGeom>
+          <a:ln>
+            <a:solidFill>
+              <a:schemeClr val="tx1"/>
+            </a:solidFill>
+            <a:tailEnd type="triangle"/>
+          </a:ln>
+        </p:spPr>
+        <p:style>
+          <a:lnRef idx="2">
+            <a:schemeClr val="accent1"/>
+          </a:lnRef>
+          <a:fillRef idx="0">
+            <a:schemeClr val="accent1"/>
+          </a:fillRef>
+          <a:effectRef idx="1">
+            <a:schemeClr val="accent1"/>
+          </a:effectRef>
+          <a:fontRef idx="minor">
+            <a:schemeClr val="tx1"/>
+          </a:fontRef>
+        </p:style>
+      </p:cxnSp>
+      <p:cxnSp>
+        <p:nvCxnSpPr>
+          <p:cNvPr id="12" name="Straight Connector 11">
+            <a:extLst>
+              <a:ext uri="{FF2B5EF4-FFF2-40B4-BE49-F238E27FC236}">
+                <a16:creationId xmlns:a16="http://schemas.microsoft.com/office/drawing/2014/main" id="{1339FB4B-D2C6-EDFE-4B4E-56F205709562}"/>
+              </a:ext>
+            </a:extLst>
+          </p:cNvPr>
+          <p:cNvCxnSpPr>
+            <a:cxnSpLocks/>
+          </p:cNvCxnSpPr>
+          <p:nvPr/>
+        </p:nvCxnSpPr>
+        <p:spPr>
+          <a:xfrm flipV="1">
+            <a:off x="7357331" y="2939342"/>
+            <a:ext cx="248126" cy="248126"/>
+          </a:xfrm>
+          <a:prstGeom prst="line">
+            <a:avLst/>
+          </a:prstGeom>
+          <a:ln>
+            <a:solidFill>
+              <a:schemeClr val="tx1"/>
+            </a:solidFill>
+          </a:ln>
+        </p:spPr>
+        <p:style>
+          <a:lnRef idx="2">
+            <a:schemeClr val="accent1"/>
+          </a:lnRef>
+          <a:fillRef idx="0">
+            <a:schemeClr val="accent1"/>
+          </a:fillRef>
+          <a:effectRef idx="1">
+            <a:schemeClr val="accent1"/>
+          </a:effectRef>
+          <a:fontRef idx="minor">
+            <a:schemeClr val="tx1"/>
+          </a:fontRef>
+        </p:style>
+      </p:cxnSp>
+      <p:sp>
+        <p:nvSpPr>
+          <p:cNvPr id="20" name="TextBox 19">
+            <a:extLst>
+              <a:ext uri="{FF2B5EF4-FFF2-40B4-BE49-F238E27FC236}">
+                <a16:creationId xmlns:a16="http://schemas.microsoft.com/office/drawing/2014/main" id="{FDC4EEAA-E28E-5BB4-3320-5B1B3F76DD3A}"/>
+              </a:ext>
+            </a:extLst>
+          </p:cNvPr>
+          <p:cNvSpPr txBox="1"/>
+          <p:nvPr/>
+        </p:nvSpPr>
+        <p:spPr>
+          <a:xfrm>
+            <a:off x="2544421" y="2800843"/>
+            <a:ext cx="354584" cy="276999"/>
+          </a:xfrm>
+          <a:prstGeom prst="rect">
+            <a:avLst/>
+          </a:prstGeom>
+          <a:noFill/>
+        </p:spPr>
+        <p:txBody>
+          <a:bodyPr wrap="none" rtlCol="0">
+            <a:spAutoFit/>
+          </a:bodyPr>
+          <a:lstStyle/>
+          <a:p>
+            <a:r>
+              <a:rPr lang="en-US" sz="1200" dirty="0"/>
+              <a:t>V</a:t>
+            </a:r>
+            <a:r>
+              <a:rPr lang="en-US" sz="1200" baseline="-25000" dirty="0"/>
+              <a:t>in</a:t>
+            </a:r>
+          </a:p>
+        </p:txBody>
+      </p:sp>
+      <p:sp>
+        <p:nvSpPr>
+          <p:cNvPr id="23" name="Rectangle: Rounded Corners 22">
+            <a:extLst>
+              <a:ext uri="{FF2B5EF4-FFF2-40B4-BE49-F238E27FC236}">
+                <a16:creationId xmlns:a16="http://schemas.microsoft.com/office/drawing/2014/main" id="{B0817178-18F9-C56C-6B89-FA71198220F2}"/>
+              </a:ext>
+            </a:extLst>
+          </p:cNvPr>
+          <p:cNvSpPr/>
+          <p:nvPr/>
+        </p:nvSpPr>
+        <p:spPr>
+          <a:xfrm>
+            <a:off x="3559169" y="1968895"/>
+            <a:ext cx="1161605" cy="2195099"/>
+          </a:xfrm>
+          <a:prstGeom prst="roundRect">
+            <a:avLst/>
+          </a:prstGeom>
+          <a:noFill/>
+          <a:ln w="19050"/>
+        </p:spPr>
+        <p:style>
+          <a:lnRef idx="2">
+            <a:schemeClr val="accent1">
+              <a:shade val="15000"/>
+            </a:schemeClr>
+          </a:lnRef>
+          <a:fillRef idx="1">
+            <a:schemeClr val="accent1"/>
+          </a:fillRef>
+          <a:effectRef idx="0">
+            <a:schemeClr val="accent1"/>
+          </a:effectRef>
+          <a:fontRef idx="minor">
+            <a:schemeClr val="lt1"/>
+          </a:fontRef>
+        </p:style>
+        <p:txBody>
+          <a:bodyPr rtlCol="0" anchor="ctr"/>
+          <a:lstStyle/>
+          <a:p>
+            <a:pPr algn="ctr"/>
+            <a:r>
+              <a:rPr lang="en-US" sz="1200" dirty="0">
+                <a:solidFill>
+                  <a:schemeClr val="tx1"/>
+                </a:solidFill>
+              </a:rPr>
+              <a:t>ADC Logic</a:t>
+            </a:r>
+          </a:p>
+        </p:txBody>
+      </p:sp>
+      <p:sp>
+        <p:nvSpPr>
+          <p:cNvPr id="25" name="TextBox 24">
+            <a:extLst>
+              <a:ext uri="{FF2B5EF4-FFF2-40B4-BE49-F238E27FC236}">
+                <a16:creationId xmlns:a16="http://schemas.microsoft.com/office/drawing/2014/main" id="{6B753254-85EC-9315-5BE8-2A678F74B695}"/>
+              </a:ext>
+            </a:extLst>
+          </p:cNvPr>
+          <p:cNvSpPr txBox="1"/>
+          <p:nvPr/>
+        </p:nvSpPr>
+        <p:spPr>
+          <a:xfrm>
+            <a:off x="3404947" y="1626393"/>
+            <a:ext cx="881973" cy="276999"/>
+          </a:xfrm>
+          <a:prstGeom prst="rect">
+            <a:avLst/>
+          </a:prstGeom>
+          <a:noFill/>
+        </p:spPr>
+        <p:txBody>
+          <a:bodyPr wrap="none" rtlCol="0">
+            <a:spAutoFit/>
+          </a:bodyPr>
+          <a:lstStyle/>
+          <a:p>
+            <a:r>
+              <a:rPr lang="en-US" sz="1200" dirty="0"/>
+              <a:t>Flash ADC</a:t>
+            </a:r>
+            <a:endParaRPr lang="en-US" sz="1200" baseline="-25000" dirty="0"/>
+          </a:p>
+        </p:txBody>
+      </p:sp>
+      <p:sp>
+        <p:nvSpPr>
+          <p:cNvPr id="28" name="Rectangle: Rounded Corners 27">
+            <a:extLst>
+              <a:ext uri="{FF2B5EF4-FFF2-40B4-BE49-F238E27FC236}">
+                <a16:creationId xmlns:a16="http://schemas.microsoft.com/office/drawing/2014/main" id="{74E7C642-72E9-A9CE-D5AE-92D74AA333AA}"/>
+              </a:ext>
+            </a:extLst>
+          </p:cNvPr>
+          <p:cNvSpPr/>
+          <p:nvPr/>
+        </p:nvSpPr>
+        <p:spPr>
+          <a:xfrm>
+            <a:off x="5345719" y="1968895"/>
+            <a:ext cx="1161605" cy="2195099"/>
+          </a:xfrm>
+          <a:prstGeom prst="roundRect">
+            <a:avLst/>
+          </a:prstGeom>
+          <a:noFill/>
+          <a:ln w="19050"/>
+        </p:spPr>
+        <p:style>
+          <a:lnRef idx="2">
+            <a:schemeClr val="accent1">
+              <a:shade val="15000"/>
+            </a:schemeClr>
+          </a:lnRef>
+          <a:fillRef idx="1">
+            <a:schemeClr val="accent1"/>
+          </a:fillRef>
+          <a:effectRef idx="0">
+            <a:schemeClr val="accent1"/>
+          </a:effectRef>
+          <a:fontRef idx="minor">
+            <a:schemeClr val="lt1"/>
+          </a:fontRef>
+        </p:style>
+        <p:txBody>
+          <a:bodyPr rtlCol="0" anchor="ctr"/>
+          <a:lstStyle/>
+          <a:p>
+            <a:pPr algn="ctr"/>
+            <a:r>
+              <a:rPr lang="en-US" sz="1200" dirty="0">
+                <a:solidFill>
+                  <a:schemeClr val="tx1"/>
+                </a:solidFill>
+              </a:rPr>
+              <a:t>Priority Encoder</a:t>
+            </a:r>
+          </a:p>
+        </p:txBody>
+      </p:sp>
+      <p:cxnSp>
+        <p:nvCxnSpPr>
+          <p:cNvPr id="32" name="Straight Arrow Connector 31">
+            <a:extLst>
+              <a:ext uri="{FF2B5EF4-FFF2-40B4-BE49-F238E27FC236}">
+                <a16:creationId xmlns:a16="http://schemas.microsoft.com/office/drawing/2014/main" id="{4E88FA0E-9FBD-600E-D71D-9AE5C744D0A5}"/>
+              </a:ext>
+            </a:extLst>
+          </p:cNvPr>
+          <p:cNvCxnSpPr>
+            <a:cxnSpLocks/>
+            <a:stCxn id="23" idx="3"/>
+            <a:endCxn id="28" idx="1"/>
+          </p:cNvCxnSpPr>
+          <p:nvPr/>
+        </p:nvCxnSpPr>
+        <p:spPr>
+          <a:xfrm>
+            <a:off x="4720774" y="3066445"/>
+            <a:ext cx="624945" cy="0"/>
+          </a:xfrm>
+          <a:prstGeom prst="straightConnector1">
+            <a:avLst/>
+          </a:prstGeom>
+          <a:ln>
+            <a:solidFill>
+              <a:schemeClr val="tx1"/>
+            </a:solidFill>
+            <a:tailEnd type="triangle"/>
+          </a:ln>
+        </p:spPr>
+        <p:style>
+          <a:lnRef idx="2">
+            <a:schemeClr val="accent1"/>
+          </a:lnRef>
+          <a:fillRef idx="0">
+            <a:schemeClr val="accent1"/>
+          </a:fillRef>
+          <a:effectRef idx="1">
+            <a:schemeClr val="accent1"/>
+          </a:effectRef>
+          <a:fontRef idx="minor">
+            <a:schemeClr val="tx1"/>
+          </a:fontRef>
+        </p:style>
+      </p:cxnSp>
+      <p:cxnSp>
+        <p:nvCxnSpPr>
+          <p:cNvPr id="35" name="Straight Connector 34">
+            <a:extLst>
+              <a:ext uri="{FF2B5EF4-FFF2-40B4-BE49-F238E27FC236}">
+                <a16:creationId xmlns:a16="http://schemas.microsoft.com/office/drawing/2014/main" id="{8EB87A0F-0DE7-CDDA-FDA7-C56FABE87B4F}"/>
+              </a:ext>
+            </a:extLst>
+          </p:cNvPr>
+          <p:cNvCxnSpPr>
+            <a:cxnSpLocks/>
+          </p:cNvCxnSpPr>
+          <p:nvPr/>
+        </p:nvCxnSpPr>
+        <p:spPr>
+          <a:xfrm flipV="1">
+            <a:off x="4909183" y="2942381"/>
+            <a:ext cx="248126" cy="248126"/>
+          </a:xfrm>
+          <a:prstGeom prst="line">
+            <a:avLst/>
+          </a:prstGeom>
+          <a:ln>
+            <a:solidFill>
+              <a:schemeClr val="tx1"/>
+            </a:solidFill>
+          </a:ln>
+        </p:spPr>
+        <p:style>
+          <a:lnRef idx="2">
+            <a:schemeClr val="accent1"/>
+          </a:lnRef>
+          <a:fillRef idx="0">
+            <a:schemeClr val="accent1"/>
+          </a:fillRef>
+          <a:effectRef idx="1">
+            <a:schemeClr val="accent1"/>
+          </a:effectRef>
+          <a:fontRef idx="minor">
+            <a:schemeClr val="tx1"/>
+          </a:fontRef>
+        </p:style>
+      </p:cxnSp>
+      <p:sp>
+        <p:nvSpPr>
+          <p:cNvPr id="36" name="TextBox 35">
+            <a:extLst>
+              <a:ext uri="{FF2B5EF4-FFF2-40B4-BE49-F238E27FC236}">
+                <a16:creationId xmlns:a16="http://schemas.microsoft.com/office/drawing/2014/main" id="{84D12813-18E8-C55B-57F2-BD1CF8E20EFE}"/>
+              </a:ext>
+            </a:extLst>
+          </p:cNvPr>
+          <p:cNvSpPr txBox="1"/>
+          <p:nvPr/>
+        </p:nvSpPr>
+        <p:spPr>
+          <a:xfrm>
+            <a:off x="4859160" y="2800843"/>
+            <a:ext cx="348172" cy="276999"/>
+          </a:xfrm>
+          <a:prstGeom prst="rect">
+            <a:avLst/>
+          </a:prstGeom>
+          <a:noFill/>
+        </p:spPr>
+        <p:txBody>
+          <a:bodyPr wrap="none" rtlCol="0">
+            <a:spAutoFit/>
+          </a:bodyPr>
+          <a:lstStyle/>
+          <a:p>
+            <a:r>
+              <a:rPr lang="en-US" sz="1200" dirty="0"/>
+              <a:t>16</a:t>
+            </a:r>
+            <a:endParaRPr lang="en-US" sz="1200" baseline="-25000" dirty="0"/>
+          </a:p>
+        </p:txBody>
+      </p:sp>
+      <p:cxnSp>
+        <p:nvCxnSpPr>
+          <p:cNvPr id="46" name="Straight Arrow Connector 45">
+            <a:extLst>
+              <a:ext uri="{FF2B5EF4-FFF2-40B4-BE49-F238E27FC236}">
+                <a16:creationId xmlns:a16="http://schemas.microsoft.com/office/drawing/2014/main" id="{2D7D4EE5-6A48-8FAE-107C-371004C5762D}"/>
+              </a:ext>
+            </a:extLst>
+          </p:cNvPr>
+          <p:cNvCxnSpPr>
+            <a:cxnSpLocks/>
+            <a:stCxn id="28" idx="3"/>
+            <a:endCxn id="5" idx="1"/>
+          </p:cNvCxnSpPr>
+          <p:nvPr/>
+        </p:nvCxnSpPr>
+        <p:spPr>
+          <a:xfrm flipV="1">
+            <a:off x="6507324" y="3066444"/>
+            <a:ext cx="1298760" cy="1"/>
+          </a:xfrm>
+          <a:prstGeom prst="straightConnector1">
+            <a:avLst/>
+          </a:prstGeom>
+          <a:ln>
+            <a:solidFill>
+              <a:schemeClr val="tx1"/>
+            </a:solidFill>
+            <a:tailEnd type="triangle"/>
+          </a:ln>
+        </p:spPr>
+        <p:style>
+          <a:lnRef idx="2">
+            <a:schemeClr val="accent1"/>
+          </a:lnRef>
+          <a:fillRef idx="0">
+            <a:schemeClr val="accent1"/>
+          </a:fillRef>
+          <a:effectRef idx="1">
+            <a:schemeClr val="accent1"/>
+          </a:effectRef>
+          <a:fontRef idx="minor">
+            <a:schemeClr val="tx1"/>
+          </a:fontRef>
+        </p:style>
+      </p:cxnSp>
+      <p:sp>
+        <p:nvSpPr>
+          <p:cNvPr id="51" name="TextBox 50">
+            <a:extLst>
+              <a:ext uri="{FF2B5EF4-FFF2-40B4-BE49-F238E27FC236}">
+                <a16:creationId xmlns:a16="http://schemas.microsoft.com/office/drawing/2014/main" id="{40F623D5-B903-5652-7A3A-F65BEC3BF11D}"/>
+              </a:ext>
+            </a:extLst>
+          </p:cNvPr>
+          <p:cNvSpPr txBox="1"/>
+          <p:nvPr/>
+        </p:nvSpPr>
+        <p:spPr>
+          <a:xfrm>
+            <a:off x="7334057" y="2820014"/>
+            <a:ext cx="266420" cy="276999"/>
+          </a:xfrm>
+          <a:prstGeom prst="rect">
+            <a:avLst/>
+          </a:prstGeom>
+          <a:noFill/>
+        </p:spPr>
+        <p:txBody>
+          <a:bodyPr wrap="none" rtlCol="0">
+            <a:spAutoFit/>
+          </a:bodyPr>
+          <a:lstStyle/>
+          <a:p>
+            <a:r>
+              <a:rPr lang="en-US" sz="1200" dirty="0"/>
+              <a:t>4</a:t>
+            </a:r>
+          </a:p>
+        </p:txBody>
+      </p:sp>
+      <p:cxnSp>
+        <p:nvCxnSpPr>
+          <p:cNvPr id="2" name="Straight Arrow Connector 1">
+            <a:extLst>
+              <a:ext uri="{FF2B5EF4-FFF2-40B4-BE49-F238E27FC236}">
+                <a16:creationId xmlns:a16="http://schemas.microsoft.com/office/drawing/2014/main" id="{BBD96E8E-8A04-A896-5060-EADAB144BF15}"/>
+              </a:ext>
+            </a:extLst>
+          </p:cNvPr>
+          <p:cNvCxnSpPr>
+            <a:cxnSpLocks/>
+          </p:cNvCxnSpPr>
+          <p:nvPr/>
+        </p:nvCxnSpPr>
+        <p:spPr>
+          <a:xfrm>
+            <a:off x="2488899" y="3488116"/>
+            <a:ext cx="1070270" cy="0"/>
+          </a:xfrm>
+          <a:prstGeom prst="straightConnector1">
+            <a:avLst/>
+          </a:prstGeom>
+          <a:ln>
+            <a:solidFill>
+              <a:schemeClr val="tx1"/>
+            </a:solidFill>
+            <a:tailEnd type="triangle"/>
+          </a:ln>
+        </p:spPr>
+        <p:style>
+          <a:lnRef idx="2">
+            <a:schemeClr val="accent1"/>
+          </a:lnRef>
+          <a:fillRef idx="0">
+            <a:schemeClr val="accent1"/>
+          </a:fillRef>
+          <a:effectRef idx="1">
+            <a:schemeClr val="accent1"/>
+          </a:effectRef>
+          <a:fontRef idx="minor">
+            <a:schemeClr val="tx1"/>
+          </a:fontRef>
+        </p:style>
+      </p:cxnSp>
+      <p:sp>
+        <p:nvSpPr>
+          <p:cNvPr id="3" name="TextBox 2">
+            <a:extLst>
+              <a:ext uri="{FF2B5EF4-FFF2-40B4-BE49-F238E27FC236}">
+                <a16:creationId xmlns:a16="http://schemas.microsoft.com/office/drawing/2014/main" id="{0AA60838-635D-D128-CFB7-A90ED538805A}"/>
+              </a:ext>
+            </a:extLst>
+          </p:cNvPr>
+          <p:cNvSpPr txBox="1"/>
+          <p:nvPr/>
+        </p:nvSpPr>
+        <p:spPr>
+          <a:xfrm>
+            <a:off x="2521995" y="3233937"/>
+            <a:ext cx="354584" cy="276999"/>
+          </a:xfrm>
+          <a:prstGeom prst="rect">
+            <a:avLst/>
+          </a:prstGeom>
+          <a:noFill/>
+        </p:spPr>
+        <p:txBody>
+          <a:bodyPr wrap="none" rtlCol="0">
+            <a:spAutoFit/>
+          </a:bodyPr>
+          <a:lstStyle/>
+          <a:p>
+            <a:r>
+              <a:rPr lang="en-US" sz="1200" dirty="0"/>
+              <a:t>En</a:t>
+            </a:r>
+            <a:endParaRPr lang="en-US" sz="1200" baseline="-25000" dirty="0"/>
+          </a:p>
+        </p:txBody>
+      </p:sp>
+    </p:spTree>
+    <p:extLst>
+      <p:ext uri="{BB962C8B-B14F-4D97-AF65-F5344CB8AC3E}">
+        <p14:creationId xmlns:p14="http://schemas.microsoft.com/office/powerpoint/2010/main" val="1505556900"/>
+      </p:ext>
+    </p:extLst>
+  </p:cSld>
+  <p:clrMapOvr>
+    <a:masterClrMapping/>
+  </p:clrMapOvr>
+</p:sld>
+</file>
+
+<file path=ppt/slides/slide3.xml><?xml version="1.0" encoding="utf-8"?>
 <p:sld xmlns:a="http://schemas.openxmlformats.org/drawingml/2006/main" xmlns:r="http://schemas.openxmlformats.org/officeDocument/2006/relationships" xmlns:p="http://schemas.openxmlformats.org/presentationml/2006/main">
   <p:cSld>
     <p:spTree>

</xml_diff>